<commit_message>
Adding base docs for the MKR Env shield
</commit_message>
<xml_diff>
--- a/doc/source_images/Schematics.pptx
+++ b/doc/source_images/Schematics.pptx
@@ -6,6 +6,7 @@
   </p:sldMasterIdLst>
   <p:sldIdLst>
     <p:sldId id="256" r:id="rId2"/>
+    <p:sldId id="257" r:id="rId3"/>
   </p:sldIdLst>
   <p:sldSz cx="12192000" cy="6858000"/>
   <p:notesSz cx="6858000" cy="9144000"/>
@@ -270,7 +271,7 @@
           <a:p>
             <a:fld id="{A46F8EAC-A684-4156-882D-CD2B89D293EB}" type="datetimeFigureOut">
               <a:rPr lang="fr-FR" smtClean="0"/>
-              <a:t>10/07/2022</a:t>
+              <a:t>11/07/2022</a:t>
             </a:fld>
             <a:endParaRPr lang="fr-FR"/>
           </a:p>
@@ -468,7 +469,7 @@
           <a:p>
             <a:fld id="{A46F8EAC-A684-4156-882D-CD2B89D293EB}" type="datetimeFigureOut">
               <a:rPr lang="fr-FR" smtClean="0"/>
-              <a:t>10/07/2022</a:t>
+              <a:t>11/07/2022</a:t>
             </a:fld>
             <a:endParaRPr lang="fr-FR"/>
           </a:p>
@@ -676,7 +677,7 @@
           <a:p>
             <a:fld id="{A46F8EAC-A684-4156-882D-CD2B89D293EB}" type="datetimeFigureOut">
               <a:rPr lang="fr-FR" smtClean="0"/>
-              <a:t>10/07/2022</a:t>
+              <a:t>11/07/2022</a:t>
             </a:fld>
             <a:endParaRPr lang="fr-FR"/>
           </a:p>
@@ -874,7 +875,7 @@
           <a:p>
             <a:fld id="{A46F8EAC-A684-4156-882D-CD2B89D293EB}" type="datetimeFigureOut">
               <a:rPr lang="fr-FR" smtClean="0"/>
-              <a:t>10/07/2022</a:t>
+              <a:t>11/07/2022</a:t>
             </a:fld>
             <a:endParaRPr lang="fr-FR"/>
           </a:p>
@@ -1149,7 +1150,7 @@
           <a:p>
             <a:fld id="{A46F8EAC-A684-4156-882D-CD2B89D293EB}" type="datetimeFigureOut">
               <a:rPr lang="fr-FR" smtClean="0"/>
-              <a:t>10/07/2022</a:t>
+              <a:t>11/07/2022</a:t>
             </a:fld>
             <a:endParaRPr lang="fr-FR"/>
           </a:p>
@@ -1414,7 +1415,7 @@
           <a:p>
             <a:fld id="{A46F8EAC-A684-4156-882D-CD2B89D293EB}" type="datetimeFigureOut">
               <a:rPr lang="fr-FR" smtClean="0"/>
-              <a:t>10/07/2022</a:t>
+              <a:t>11/07/2022</a:t>
             </a:fld>
             <a:endParaRPr lang="fr-FR"/>
           </a:p>
@@ -1826,7 +1827,7 @@
           <a:p>
             <a:fld id="{A46F8EAC-A684-4156-882D-CD2B89D293EB}" type="datetimeFigureOut">
               <a:rPr lang="fr-FR" smtClean="0"/>
-              <a:t>10/07/2022</a:t>
+              <a:t>11/07/2022</a:t>
             </a:fld>
             <a:endParaRPr lang="fr-FR"/>
           </a:p>
@@ -1967,7 +1968,7 @@
           <a:p>
             <a:fld id="{A46F8EAC-A684-4156-882D-CD2B89D293EB}" type="datetimeFigureOut">
               <a:rPr lang="fr-FR" smtClean="0"/>
-              <a:t>10/07/2022</a:t>
+              <a:t>11/07/2022</a:t>
             </a:fld>
             <a:endParaRPr lang="fr-FR"/>
           </a:p>
@@ -2080,7 +2081,7 @@
           <a:p>
             <a:fld id="{A46F8EAC-A684-4156-882D-CD2B89D293EB}" type="datetimeFigureOut">
               <a:rPr lang="fr-FR" smtClean="0"/>
-              <a:t>10/07/2022</a:t>
+              <a:t>11/07/2022</a:t>
             </a:fld>
             <a:endParaRPr lang="fr-FR"/>
           </a:p>
@@ -2391,7 +2392,7 @@
           <a:p>
             <a:fld id="{A46F8EAC-A684-4156-882D-CD2B89D293EB}" type="datetimeFigureOut">
               <a:rPr lang="fr-FR" smtClean="0"/>
-              <a:t>10/07/2022</a:t>
+              <a:t>11/07/2022</a:t>
             </a:fld>
             <a:endParaRPr lang="fr-FR"/>
           </a:p>
@@ -2679,7 +2680,7 @@
           <a:p>
             <a:fld id="{A46F8EAC-A684-4156-882D-CD2B89D293EB}" type="datetimeFigureOut">
               <a:rPr lang="fr-FR" smtClean="0"/>
-              <a:t>10/07/2022</a:t>
+              <a:t>11/07/2022</a:t>
             </a:fld>
             <a:endParaRPr lang="fr-FR"/>
           </a:p>
@@ -2920,7 +2921,7 @@
           <a:p>
             <a:fld id="{A46F8EAC-A684-4156-882D-CD2B89D293EB}" type="datetimeFigureOut">
               <a:rPr lang="fr-FR" smtClean="0"/>
-              <a:t>10/07/2022</a:t>
+              <a:t>11/07/2022</a:t>
             </a:fld>
             <a:endParaRPr lang="fr-FR"/>
           </a:p>
@@ -4955,6 +4956,971 @@
 </p:sld>
 </file>
 
+<file path=ppt/slides/slide2.xml><?xml version="1.0" encoding="utf-8"?>
+<p:sld xmlns:a="http://schemas.openxmlformats.org/drawingml/2006/main" xmlns:r="http://schemas.openxmlformats.org/officeDocument/2006/relationships" xmlns:p="http://schemas.openxmlformats.org/presentationml/2006/main">
+  <p:cSld>
+    <p:spTree>
+      <p:nvGrpSpPr>
+        <p:cNvPr id="1" name=""/>
+        <p:cNvGrpSpPr/>
+        <p:nvPr/>
+      </p:nvGrpSpPr>
+      <p:grpSpPr>
+        <a:xfrm>
+          <a:off x="0" y="0"/>
+          <a:ext cx="0" cy="0"/>
+          <a:chOff x="0" y="0"/>
+          <a:chExt cx="0" cy="0"/>
+        </a:xfrm>
+      </p:grpSpPr>
+      <p:pic>
+        <p:nvPicPr>
+          <p:cNvPr id="5" name="Image 4">
+            <a:extLst>
+              <a:ext uri="{FF2B5EF4-FFF2-40B4-BE49-F238E27FC236}">
+                <a16:creationId xmlns:a16="http://schemas.microsoft.com/office/drawing/2014/main" id="{2FA88BB4-E4D0-E28C-318C-90F6BEAF1FEA}"/>
+              </a:ext>
+            </a:extLst>
+          </p:cNvPr>
+          <p:cNvPicPr>
+            <a:picLocks noChangeAspect="1"/>
+          </p:cNvPicPr>
+          <p:nvPr/>
+        </p:nvPicPr>
+        <p:blipFill>
+          <a:blip r:embed="rId2">
+            <a:extLst>
+              <a:ext uri="{28A0092B-C50C-407E-A947-70E740481C1C}">
+                <a14:useLocalDpi xmlns:a14="http://schemas.microsoft.com/office/drawing/2010/main" val="0"/>
+              </a:ext>
+            </a:extLst>
+          </a:blip>
+          <a:stretch>
+            <a:fillRect/>
+          </a:stretch>
+        </p:blipFill>
+        <p:spPr>
+          <a:xfrm>
+            <a:off x="5069751" y="888780"/>
+            <a:ext cx="2052498" cy="5080440"/>
+          </a:xfrm>
+          <a:prstGeom prst="rect">
+            <a:avLst/>
+          </a:prstGeom>
+        </p:spPr>
+      </p:pic>
+      <p:sp>
+        <p:nvSpPr>
+          <p:cNvPr id="6" name="Flèche : pentagone 5">
+            <a:extLst>
+              <a:ext uri="{FF2B5EF4-FFF2-40B4-BE49-F238E27FC236}">
+                <a16:creationId xmlns:a16="http://schemas.microsoft.com/office/drawing/2014/main" id="{17AF4754-5FCE-BD62-663D-0984FD8AB043}"/>
+              </a:ext>
+            </a:extLst>
+          </p:cNvPr>
+          <p:cNvSpPr/>
+          <p:nvPr/>
+        </p:nvSpPr>
+        <p:spPr>
+          <a:xfrm>
+            <a:off x="4343234" y="3014035"/>
+            <a:ext cx="691025" cy="210093"/>
+          </a:xfrm>
+          <a:prstGeom prst="homePlate">
+            <a:avLst/>
+          </a:prstGeom>
+          <a:solidFill>
+            <a:srgbClr val="92D050"/>
+          </a:solidFill>
+          <a:ln>
+            <a:solidFill>
+              <a:srgbClr val="92D050"/>
+            </a:solidFill>
+          </a:ln>
+        </p:spPr>
+        <p:style>
+          <a:lnRef idx="2">
+            <a:schemeClr val="accent6">
+              <a:shade val="50000"/>
+            </a:schemeClr>
+          </a:lnRef>
+          <a:fillRef idx="1">
+            <a:schemeClr val="accent6"/>
+          </a:fillRef>
+          <a:effectRef idx="0">
+            <a:schemeClr val="accent6"/>
+          </a:effectRef>
+          <a:fontRef idx="minor">
+            <a:schemeClr val="lt1"/>
+          </a:fontRef>
+        </p:style>
+        <p:txBody>
+          <a:bodyPr wrap="none" rtlCol="0" anchor="ctr"/>
+          <a:lstStyle/>
+          <a:p>
+            <a:pPr algn="ctr"/>
+            <a:r>
+              <a:rPr lang="en-US"/>
+              <a:t>TX</a:t>
+            </a:r>
+          </a:p>
+        </p:txBody>
+      </p:sp>
+      <p:sp>
+        <p:nvSpPr>
+          <p:cNvPr id="7" name="Flèche : pentagone 6">
+            <a:extLst>
+              <a:ext uri="{FF2B5EF4-FFF2-40B4-BE49-F238E27FC236}">
+                <a16:creationId xmlns:a16="http://schemas.microsoft.com/office/drawing/2014/main" id="{0C37479A-9070-3E77-E35B-F5246BBD0540}"/>
+              </a:ext>
+            </a:extLst>
+          </p:cNvPr>
+          <p:cNvSpPr/>
+          <p:nvPr/>
+        </p:nvSpPr>
+        <p:spPr>
+          <a:xfrm>
+            <a:off x="4343234" y="2802357"/>
+            <a:ext cx="691025" cy="210093"/>
+          </a:xfrm>
+          <a:prstGeom prst="homePlate">
+            <a:avLst/>
+          </a:prstGeom>
+          <a:solidFill>
+            <a:srgbClr val="92D050"/>
+          </a:solidFill>
+          <a:ln>
+            <a:solidFill>
+              <a:srgbClr val="92D050"/>
+            </a:solidFill>
+          </a:ln>
+        </p:spPr>
+        <p:style>
+          <a:lnRef idx="2">
+            <a:schemeClr val="accent6">
+              <a:shade val="50000"/>
+            </a:schemeClr>
+          </a:lnRef>
+          <a:fillRef idx="1">
+            <a:schemeClr val="accent6"/>
+          </a:fillRef>
+          <a:effectRef idx="0">
+            <a:schemeClr val="accent6"/>
+          </a:effectRef>
+          <a:fontRef idx="minor">
+            <a:schemeClr val="lt1"/>
+          </a:fontRef>
+        </p:style>
+        <p:txBody>
+          <a:bodyPr wrap="none" rtlCol="0" anchor="ctr"/>
+          <a:lstStyle/>
+          <a:p>
+            <a:pPr algn="ctr"/>
+            <a:r>
+              <a:rPr lang="en-US"/>
+              <a:t>RX</a:t>
+            </a:r>
+          </a:p>
+        </p:txBody>
+      </p:sp>
+      <p:sp>
+        <p:nvSpPr>
+          <p:cNvPr id="8" name="Flèche : pentagone 7">
+            <a:extLst>
+              <a:ext uri="{FF2B5EF4-FFF2-40B4-BE49-F238E27FC236}">
+                <a16:creationId xmlns:a16="http://schemas.microsoft.com/office/drawing/2014/main" id="{4D752E0B-BD06-328F-B1D3-9B4DF886111D}"/>
+              </a:ext>
+            </a:extLst>
+          </p:cNvPr>
+          <p:cNvSpPr/>
+          <p:nvPr/>
+        </p:nvSpPr>
+        <p:spPr>
+          <a:xfrm>
+            <a:off x="4343890" y="1999808"/>
+            <a:ext cx="691025" cy="210094"/>
+          </a:xfrm>
+          <a:prstGeom prst="homePlate">
+            <a:avLst/>
+          </a:prstGeom>
+          <a:solidFill>
+            <a:schemeClr val="accent4">
+              <a:lumMod val="75000"/>
+            </a:schemeClr>
+          </a:solidFill>
+          <a:ln>
+            <a:solidFill>
+              <a:schemeClr val="accent4">
+                <a:lumMod val="75000"/>
+              </a:schemeClr>
+            </a:solidFill>
+          </a:ln>
+        </p:spPr>
+        <p:style>
+          <a:lnRef idx="2">
+            <a:schemeClr val="accent1">
+              <a:shade val="50000"/>
+            </a:schemeClr>
+          </a:lnRef>
+          <a:fillRef idx="1">
+            <a:schemeClr val="accent1"/>
+          </a:fillRef>
+          <a:effectRef idx="0">
+            <a:schemeClr val="accent1"/>
+          </a:effectRef>
+          <a:fontRef idx="minor">
+            <a:schemeClr val="lt1"/>
+          </a:fontRef>
+        </p:style>
+        <p:txBody>
+          <a:bodyPr wrap="none" rtlCol="0" anchor="ctr"/>
+          <a:lstStyle/>
+          <a:p>
+            <a:pPr algn="ctr"/>
+            <a:r>
+              <a:rPr lang="en-US"/>
+              <a:t>SCK</a:t>
+            </a:r>
+          </a:p>
+        </p:txBody>
+      </p:sp>
+      <p:sp>
+        <p:nvSpPr>
+          <p:cNvPr id="9" name="Flèche : pentagone 8">
+            <a:extLst>
+              <a:ext uri="{FF2B5EF4-FFF2-40B4-BE49-F238E27FC236}">
+                <a16:creationId xmlns:a16="http://schemas.microsoft.com/office/drawing/2014/main" id="{E011D274-8AF1-819A-A122-8859262F2CA8}"/>
+              </a:ext>
+            </a:extLst>
+          </p:cNvPr>
+          <p:cNvSpPr/>
+          <p:nvPr/>
+        </p:nvSpPr>
+        <p:spPr>
+          <a:xfrm>
+            <a:off x="4343236" y="2188894"/>
+            <a:ext cx="691025" cy="210093"/>
+          </a:xfrm>
+          <a:prstGeom prst="homePlate">
+            <a:avLst/>
+          </a:prstGeom>
+          <a:solidFill>
+            <a:schemeClr val="accent4">
+              <a:lumMod val="75000"/>
+            </a:schemeClr>
+          </a:solidFill>
+          <a:ln>
+            <a:solidFill>
+              <a:schemeClr val="accent4">
+                <a:lumMod val="75000"/>
+              </a:schemeClr>
+            </a:solidFill>
+          </a:ln>
+        </p:spPr>
+        <p:style>
+          <a:lnRef idx="2">
+            <a:schemeClr val="accent1">
+              <a:shade val="50000"/>
+            </a:schemeClr>
+          </a:lnRef>
+          <a:fillRef idx="1">
+            <a:schemeClr val="accent1"/>
+          </a:fillRef>
+          <a:effectRef idx="0">
+            <a:schemeClr val="accent1"/>
+          </a:effectRef>
+          <a:fontRef idx="minor">
+            <a:schemeClr val="lt1"/>
+          </a:fontRef>
+        </p:style>
+        <p:txBody>
+          <a:bodyPr wrap="none" rtlCol="0" anchor="ctr"/>
+          <a:lstStyle/>
+          <a:p>
+            <a:pPr algn="ctr"/>
+            <a:r>
+              <a:rPr lang="en-US"/>
+              <a:t>MISO</a:t>
+            </a:r>
+          </a:p>
+        </p:txBody>
+      </p:sp>
+      <p:sp>
+        <p:nvSpPr>
+          <p:cNvPr id="10" name="Flèche : pentagone 9">
+            <a:extLst>
+              <a:ext uri="{FF2B5EF4-FFF2-40B4-BE49-F238E27FC236}">
+                <a16:creationId xmlns:a16="http://schemas.microsoft.com/office/drawing/2014/main" id="{6FFCC9B4-43A4-9A84-A203-76A9DF0380D0}"/>
+              </a:ext>
+            </a:extLst>
+          </p:cNvPr>
+          <p:cNvSpPr/>
+          <p:nvPr/>
+        </p:nvSpPr>
+        <p:spPr>
+          <a:xfrm>
+            <a:off x="4343237" y="1788411"/>
+            <a:ext cx="691025" cy="210094"/>
+          </a:xfrm>
+          <a:prstGeom prst="homePlate">
+            <a:avLst/>
+          </a:prstGeom>
+          <a:solidFill>
+            <a:schemeClr val="accent4">
+              <a:lumMod val="75000"/>
+            </a:schemeClr>
+          </a:solidFill>
+          <a:ln>
+            <a:solidFill>
+              <a:schemeClr val="accent4">
+                <a:lumMod val="75000"/>
+              </a:schemeClr>
+            </a:solidFill>
+          </a:ln>
+        </p:spPr>
+        <p:style>
+          <a:lnRef idx="2">
+            <a:schemeClr val="accent1">
+              <a:shade val="50000"/>
+            </a:schemeClr>
+          </a:lnRef>
+          <a:fillRef idx="1">
+            <a:schemeClr val="accent1"/>
+          </a:fillRef>
+          <a:effectRef idx="0">
+            <a:schemeClr val="accent1"/>
+          </a:effectRef>
+          <a:fontRef idx="minor">
+            <a:schemeClr val="lt1"/>
+          </a:fontRef>
+        </p:style>
+        <p:txBody>
+          <a:bodyPr wrap="none" rtlCol="0" anchor="ctr"/>
+          <a:lstStyle/>
+          <a:p>
+            <a:pPr algn="ctr"/>
+            <a:r>
+              <a:rPr lang="en-US"/>
+              <a:t>MOSI</a:t>
+            </a:r>
+          </a:p>
+        </p:txBody>
+      </p:sp>
+      <p:sp>
+        <p:nvSpPr>
+          <p:cNvPr id="11" name="Flèche : pentagone 10">
+            <a:extLst>
+              <a:ext uri="{FF2B5EF4-FFF2-40B4-BE49-F238E27FC236}">
+                <a16:creationId xmlns:a16="http://schemas.microsoft.com/office/drawing/2014/main" id="{B202D31B-5870-6EFE-4CDA-8E0F0C2A6990}"/>
+              </a:ext>
+            </a:extLst>
+          </p:cNvPr>
+          <p:cNvSpPr/>
+          <p:nvPr/>
+        </p:nvSpPr>
+        <p:spPr>
+          <a:xfrm>
+            <a:off x="4343235" y="2611968"/>
+            <a:ext cx="691025" cy="210094"/>
+          </a:xfrm>
+          <a:prstGeom prst="homePlate">
+            <a:avLst/>
+          </a:prstGeom>
+          <a:solidFill>
+            <a:schemeClr val="accent1">
+              <a:lumMod val="75000"/>
+            </a:schemeClr>
+          </a:solidFill>
+          <a:ln>
+            <a:solidFill>
+              <a:schemeClr val="accent1">
+                <a:lumMod val="75000"/>
+              </a:schemeClr>
+            </a:solidFill>
+          </a:ln>
+        </p:spPr>
+        <p:style>
+          <a:lnRef idx="2">
+            <a:schemeClr val="accent1">
+              <a:shade val="50000"/>
+            </a:schemeClr>
+          </a:lnRef>
+          <a:fillRef idx="1">
+            <a:schemeClr val="accent1"/>
+          </a:fillRef>
+          <a:effectRef idx="0">
+            <a:schemeClr val="accent1"/>
+          </a:effectRef>
+          <a:fontRef idx="minor">
+            <a:schemeClr val="lt1"/>
+          </a:fontRef>
+        </p:style>
+        <p:txBody>
+          <a:bodyPr wrap="none" rtlCol="0" anchor="ctr"/>
+          <a:lstStyle/>
+          <a:p>
+            <a:pPr algn="ctr"/>
+            <a:r>
+              <a:rPr lang="en-US"/>
+              <a:t>SCL</a:t>
+            </a:r>
+          </a:p>
+        </p:txBody>
+      </p:sp>
+      <p:sp>
+        <p:nvSpPr>
+          <p:cNvPr id="12" name="Flèche : pentagone 11">
+            <a:extLst>
+              <a:ext uri="{FF2B5EF4-FFF2-40B4-BE49-F238E27FC236}">
+                <a16:creationId xmlns:a16="http://schemas.microsoft.com/office/drawing/2014/main" id="{0A638C98-EEB0-1C5F-33DB-5040EA2D4594}"/>
+              </a:ext>
+            </a:extLst>
+          </p:cNvPr>
+          <p:cNvSpPr/>
+          <p:nvPr/>
+        </p:nvSpPr>
+        <p:spPr>
+          <a:xfrm>
+            <a:off x="4343236" y="2401874"/>
+            <a:ext cx="691025" cy="210094"/>
+          </a:xfrm>
+          <a:prstGeom prst="homePlate">
+            <a:avLst/>
+          </a:prstGeom>
+          <a:solidFill>
+            <a:schemeClr val="accent1">
+              <a:lumMod val="75000"/>
+            </a:schemeClr>
+          </a:solidFill>
+          <a:ln>
+            <a:solidFill>
+              <a:schemeClr val="accent1">
+                <a:lumMod val="75000"/>
+              </a:schemeClr>
+            </a:solidFill>
+          </a:ln>
+        </p:spPr>
+        <p:style>
+          <a:lnRef idx="2">
+            <a:schemeClr val="accent1">
+              <a:shade val="50000"/>
+            </a:schemeClr>
+          </a:lnRef>
+          <a:fillRef idx="1">
+            <a:schemeClr val="accent1"/>
+          </a:fillRef>
+          <a:effectRef idx="0">
+            <a:schemeClr val="accent1"/>
+          </a:effectRef>
+          <a:fontRef idx="minor">
+            <a:schemeClr val="lt1"/>
+          </a:fontRef>
+        </p:style>
+        <p:txBody>
+          <a:bodyPr wrap="none" rtlCol="0" anchor="ctr"/>
+          <a:lstStyle/>
+          <a:p>
+            <a:pPr algn="ctr"/>
+            <a:r>
+              <a:rPr lang="en-US"/>
+              <a:t>SDA</a:t>
+            </a:r>
+          </a:p>
+        </p:txBody>
+      </p:sp>
+      <p:sp>
+        <p:nvSpPr>
+          <p:cNvPr id="13" name="Flèche : pentagone 12">
+            <a:extLst>
+              <a:ext uri="{FF2B5EF4-FFF2-40B4-BE49-F238E27FC236}">
+                <a16:creationId xmlns:a16="http://schemas.microsoft.com/office/drawing/2014/main" id="{8BC34EE1-07E8-DE15-85BC-84E976C9D68C}"/>
+              </a:ext>
+            </a:extLst>
+          </p:cNvPr>
+          <p:cNvSpPr/>
+          <p:nvPr/>
+        </p:nvSpPr>
+        <p:spPr>
+          <a:xfrm flipH="1">
+            <a:off x="7157084" y="1578317"/>
+            <a:ext cx="1438274" cy="210094"/>
+          </a:xfrm>
+          <a:prstGeom prst="homePlate">
+            <a:avLst/>
+          </a:prstGeom>
+          <a:solidFill>
+            <a:srgbClr val="00B0F0"/>
+          </a:solidFill>
+          <a:ln>
+            <a:solidFill>
+              <a:srgbClr val="00B0F0"/>
+            </a:solidFill>
+          </a:ln>
+        </p:spPr>
+        <p:style>
+          <a:lnRef idx="2">
+            <a:schemeClr val="accent1">
+              <a:shade val="50000"/>
+            </a:schemeClr>
+          </a:lnRef>
+          <a:fillRef idx="1">
+            <a:schemeClr val="accent1"/>
+          </a:fillRef>
+          <a:effectRef idx="0">
+            <a:schemeClr val="accent1"/>
+          </a:effectRef>
+          <a:fontRef idx="minor">
+            <a:schemeClr val="lt1"/>
+          </a:fontRef>
+        </p:style>
+        <p:txBody>
+          <a:bodyPr wrap="none" rtlCol="0" anchor="ctr"/>
+          <a:lstStyle/>
+          <a:p>
+            <a:pPr algn="ctr"/>
+            <a:r>
+              <a:rPr lang="en-US"/>
+              <a:t>CS SD card</a:t>
+            </a:r>
+          </a:p>
+        </p:txBody>
+      </p:sp>
+      <p:sp>
+        <p:nvSpPr>
+          <p:cNvPr id="14" name="Flèche : pentagone 13">
+            <a:extLst>
+              <a:ext uri="{FF2B5EF4-FFF2-40B4-BE49-F238E27FC236}">
+                <a16:creationId xmlns:a16="http://schemas.microsoft.com/office/drawing/2014/main" id="{45839E34-E3E4-F56C-5630-2740430674AA}"/>
+              </a:ext>
+            </a:extLst>
+          </p:cNvPr>
+          <p:cNvSpPr/>
+          <p:nvPr/>
+        </p:nvSpPr>
+        <p:spPr>
+          <a:xfrm flipH="1">
+            <a:off x="7157083" y="3429000"/>
+            <a:ext cx="1438276" cy="210094"/>
+          </a:xfrm>
+          <a:prstGeom prst="homePlate">
+            <a:avLst/>
+          </a:prstGeom>
+          <a:solidFill>
+            <a:srgbClr val="00B0F0"/>
+          </a:solidFill>
+          <a:ln>
+            <a:solidFill>
+              <a:srgbClr val="00B0F0"/>
+            </a:solidFill>
+          </a:ln>
+        </p:spPr>
+        <p:style>
+          <a:lnRef idx="2">
+            <a:schemeClr val="accent1">
+              <a:shade val="50000"/>
+            </a:schemeClr>
+          </a:lnRef>
+          <a:fillRef idx="1">
+            <a:schemeClr val="accent1"/>
+          </a:fillRef>
+          <a:effectRef idx="0">
+            <a:schemeClr val="accent1"/>
+          </a:effectRef>
+          <a:fontRef idx="minor">
+            <a:schemeClr val="lt1"/>
+          </a:fontRef>
+        </p:style>
+        <p:txBody>
+          <a:bodyPr wrap="none" rtlCol="0" anchor="ctr"/>
+          <a:lstStyle/>
+          <a:p>
+            <a:pPr algn="ctr"/>
+            <a:r>
+              <a:rPr lang="en-US"/>
+              <a:t>Light Sensor</a:t>
+            </a:r>
+          </a:p>
+        </p:txBody>
+      </p:sp>
+      <p:sp>
+        <p:nvSpPr>
+          <p:cNvPr id="15" name="Flèche : pentagone 14">
+            <a:extLst>
+              <a:ext uri="{FF2B5EF4-FFF2-40B4-BE49-F238E27FC236}">
+                <a16:creationId xmlns:a16="http://schemas.microsoft.com/office/drawing/2014/main" id="{0A769D0C-7551-F1EB-5A3A-F58A08FC556A}"/>
+              </a:ext>
+            </a:extLst>
+          </p:cNvPr>
+          <p:cNvSpPr/>
+          <p:nvPr/>
+        </p:nvSpPr>
+        <p:spPr>
+          <a:xfrm>
+            <a:off x="2789108" y="1578317"/>
+            <a:ext cx="766354" cy="210093"/>
+          </a:xfrm>
+          <a:prstGeom prst="homePlate">
+            <a:avLst/>
+          </a:prstGeom>
+          <a:solidFill>
+            <a:schemeClr val="tx1">
+              <a:lumMod val="65000"/>
+              <a:lumOff val="35000"/>
+            </a:schemeClr>
+          </a:solidFill>
+          <a:ln>
+            <a:solidFill>
+              <a:schemeClr val="tx1">
+                <a:lumMod val="65000"/>
+                <a:lumOff val="35000"/>
+              </a:schemeClr>
+            </a:solidFill>
+          </a:ln>
+        </p:spPr>
+        <p:style>
+          <a:lnRef idx="2">
+            <a:schemeClr val="accent6">
+              <a:shade val="50000"/>
+            </a:schemeClr>
+          </a:lnRef>
+          <a:fillRef idx="1">
+            <a:schemeClr val="accent6"/>
+          </a:fillRef>
+          <a:effectRef idx="0">
+            <a:schemeClr val="accent6"/>
+          </a:effectRef>
+          <a:fontRef idx="minor">
+            <a:schemeClr val="lt1"/>
+          </a:fontRef>
+        </p:style>
+        <p:txBody>
+          <a:bodyPr wrap="none" rtlCol="0" anchor="ctr"/>
+          <a:lstStyle/>
+          <a:p>
+            <a:pPr algn="ctr"/>
+            <a:r>
+              <a:rPr lang="en-US"/>
+              <a:t>PIN 7</a:t>
+            </a:r>
+          </a:p>
+        </p:txBody>
+      </p:sp>
+      <p:sp>
+        <p:nvSpPr>
+          <p:cNvPr id="16" name="Flèche : pentagone 15">
+            <a:extLst>
+              <a:ext uri="{FF2B5EF4-FFF2-40B4-BE49-F238E27FC236}">
+                <a16:creationId xmlns:a16="http://schemas.microsoft.com/office/drawing/2014/main" id="{E9554151-7EC7-A4AC-4BC3-312C6F2DA2E5}"/>
+              </a:ext>
+            </a:extLst>
+          </p:cNvPr>
+          <p:cNvSpPr/>
+          <p:nvPr/>
+        </p:nvSpPr>
+        <p:spPr>
+          <a:xfrm flipH="1">
+            <a:off x="8630191" y="1578317"/>
+            <a:ext cx="766354" cy="210093"/>
+          </a:xfrm>
+          <a:prstGeom prst="homePlate">
+            <a:avLst/>
+          </a:prstGeom>
+          <a:solidFill>
+            <a:schemeClr val="tx1">
+              <a:lumMod val="65000"/>
+              <a:lumOff val="35000"/>
+            </a:schemeClr>
+          </a:solidFill>
+          <a:ln>
+            <a:solidFill>
+              <a:schemeClr val="tx1">
+                <a:lumMod val="65000"/>
+                <a:lumOff val="35000"/>
+              </a:schemeClr>
+            </a:solidFill>
+          </a:ln>
+        </p:spPr>
+        <p:style>
+          <a:lnRef idx="2">
+            <a:schemeClr val="accent6">
+              <a:shade val="50000"/>
+            </a:schemeClr>
+          </a:lnRef>
+          <a:fillRef idx="1">
+            <a:schemeClr val="accent6"/>
+          </a:fillRef>
+          <a:effectRef idx="0">
+            <a:schemeClr val="accent6"/>
+          </a:effectRef>
+          <a:fontRef idx="minor">
+            <a:schemeClr val="lt1"/>
+          </a:fontRef>
+        </p:style>
+        <p:txBody>
+          <a:bodyPr wrap="none" rtlCol="0" anchor="ctr"/>
+          <a:lstStyle/>
+          <a:p>
+            <a:pPr algn="ctr"/>
+            <a:r>
+              <a:rPr lang="en-US"/>
+              <a:t>PIN 4</a:t>
+            </a:r>
+          </a:p>
+        </p:txBody>
+      </p:sp>
+      <p:sp>
+        <p:nvSpPr>
+          <p:cNvPr id="17" name="Flèche : pentagone 16">
+            <a:extLst>
+              <a:ext uri="{FF2B5EF4-FFF2-40B4-BE49-F238E27FC236}">
+                <a16:creationId xmlns:a16="http://schemas.microsoft.com/office/drawing/2014/main" id="{DC7A5D49-FAF7-F4CC-06F4-9728B504A513}"/>
+              </a:ext>
+            </a:extLst>
+          </p:cNvPr>
+          <p:cNvSpPr/>
+          <p:nvPr/>
+        </p:nvSpPr>
+        <p:spPr>
+          <a:xfrm flipH="1">
+            <a:off x="8630192" y="3429000"/>
+            <a:ext cx="766356" cy="210093"/>
+          </a:xfrm>
+          <a:prstGeom prst="homePlate">
+            <a:avLst/>
+          </a:prstGeom>
+          <a:solidFill>
+            <a:schemeClr val="tx1">
+              <a:lumMod val="65000"/>
+              <a:lumOff val="35000"/>
+            </a:schemeClr>
+          </a:solidFill>
+          <a:ln>
+            <a:solidFill>
+              <a:schemeClr val="tx1">
+                <a:lumMod val="65000"/>
+                <a:lumOff val="35000"/>
+              </a:schemeClr>
+            </a:solidFill>
+          </a:ln>
+        </p:spPr>
+        <p:style>
+          <a:lnRef idx="2">
+            <a:schemeClr val="accent6">
+              <a:shade val="50000"/>
+            </a:schemeClr>
+          </a:lnRef>
+          <a:fillRef idx="1">
+            <a:schemeClr val="accent6"/>
+          </a:fillRef>
+          <a:effectRef idx="0">
+            <a:schemeClr val="accent6"/>
+          </a:effectRef>
+          <a:fontRef idx="minor">
+            <a:schemeClr val="lt1"/>
+          </a:fontRef>
+        </p:style>
+        <p:txBody>
+          <a:bodyPr wrap="none" rtlCol="0" anchor="ctr"/>
+          <a:lstStyle/>
+          <a:p>
+            <a:pPr algn="ctr"/>
+            <a:r>
+              <a:rPr lang="en-US"/>
+              <a:t>PIN A2</a:t>
+            </a:r>
+          </a:p>
+        </p:txBody>
+      </p:sp>
+      <p:sp>
+        <p:nvSpPr>
+          <p:cNvPr id="18" name="Flèche : pentagone 17">
+            <a:extLst>
+              <a:ext uri="{FF2B5EF4-FFF2-40B4-BE49-F238E27FC236}">
+                <a16:creationId xmlns:a16="http://schemas.microsoft.com/office/drawing/2014/main" id="{EB7EA40B-1949-AB27-6146-B40476B235CF}"/>
+              </a:ext>
+            </a:extLst>
+          </p:cNvPr>
+          <p:cNvSpPr/>
+          <p:nvPr/>
+        </p:nvSpPr>
+        <p:spPr>
+          <a:xfrm>
+            <a:off x="3595985" y="1567022"/>
+            <a:ext cx="1438274" cy="210094"/>
+          </a:xfrm>
+          <a:prstGeom prst="homePlate">
+            <a:avLst/>
+          </a:prstGeom>
+          <a:solidFill>
+            <a:srgbClr val="00B0F0"/>
+          </a:solidFill>
+          <a:ln>
+            <a:solidFill>
+              <a:srgbClr val="00B0F0"/>
+            </a:solidFill>
+          </a:ln>
+        </p:spPr>
+        <p:style>
+          <a:lnRef idx="2">
+            <a:schemeClr val="accent1">
+              <a:shade val="50000"/>
+            </a:schemeClr>
+          </a:lnRef>
+          <a:fillRef idx="1">
+            <a:schemeClr val="accent1"/>
+          </a:fillRef>
+          <a:effectRef idx="0">
+            <a:schemeClr val="accent1"/>
+          </a:effectRef>
+          <a:fontRef idx="minor">
+            <a:schemeClr val="lt1"/>
+          </a:fontRef>
+        </p:style>
+        <p:txBody>
+          <a:bodyPr wrap="none" rtlCol="0" anchor="ctr"/>
+          <a:lstStyle/>
+          <a:p>
+            <a:pPr algn="ctr"/>
+            <a:r>
+              <a:rPr lang="en-US"/>
+              <a:t>Interrupt P</a:t>
+            </a:r>
+          </a:p>
+        </p:txBody>
+      </p:sp>
+      <p:sp>
+        <p:nvSpPr>
+          <p:cNvPr id="19" name="Flèche : pentagone 18">
+            <a:extLst>
+              <a:ext uri="{FF2B5EF4-FFF2-40B4-BE49-F238E27FC236}">
+                <a16:creationId xmlns:a16="http://schemas.microsoft.com/office/drawing/2014/main" id="{3CC9AD38-7DD9-4666-843E-443896D1EE0A}"/>
+              </a:ext>
+            </a:extLst>
+          </p:cNvPr>
+          <p:cNvSpPr/>
+          <p:nvPr/>
+        </p:nvSpPr>
+        <p:spPr>
+          <a:xfrm>
+            <a:off x="2789108" y="1373279"/>
+            <a:ext cx="766354" cy="210093"/>
+          </a:xfrm>
+          <a:prstGeom prst="homePlate">
+            <a:avLst/>
+          </a:prstGeom>
+          <a:solidFill>
+            <a:schemeClr val="tx1">
+              <a:lumMod val="65000"/>
+              <a:lumOff val="35000"/>
+            </a:schemeClr>
+          </a:solidFill>
+          <a:ln>
+            <a:solidFill>
+              <a:schemeClr val="tx1">
+                <a:lumMod val="65000"/>
+                <a:lumOff val="35000"/>
+              </a:schemeClr>
+            </a:solidFill>
+          </a:ln>
+        </p:spPr>
+        <p:style>
+          <a:lnRef idx="2">
+            <a:schemeClr val="accent6">
+              <a:shade val="50000"/>
+            </a:schemeClr>
+          </a:lnRef>
+          <a:fillRef idx="1">
+            <a:schemeClr val="accent6"/>
+          </a:fillRef>
+          <a:effectRef idx="0">
+            <a:schemeClr val="accent6"/>
+          </a:effectRef>
+          <a:fontRef idx="minor">
+            <a:schemeClr val="lt1"/>
+          </a:fontRef>
+        </p:style>
+        <p:txBody>
+          <a:bodyPr wrap="none" rtlCol="0" anchor="ctr"/>
+          <a:lstStyle/>
+          <a:p>
+            <a:pPr algn="ctr"/>
+            <a:r>
+              <a:rPr lang="en-US"/>
+              <a:t>PIN 6</a:t>
+            </a:r>
+          </a:p>
+        </p:txBody>
+      </p:sp>
+      <p:sp>
+        <p:nvSpPr>
+          <p:cNvPr id="20" name="Flèche : pentagone 19">
+            <a:extLst>
+              <a:ext uri="{FF2B5EF4-FFF2-40B4-BE49-F238E27FC236}">
+                <a16:creationId xmlns:a16="http://schemas.microsoft.com/office/drawing/2014/main" id="{7A51A9C8-31AF-5D27-07FA-03D203E2B51C}"/>
+              </a:ext>
+            </a:extLst>
+          </p:cNvPr>
+          <p:cNvSpPr/>
+          <p:nvPr/>
+        </p:nvSpPr>
+        <p:spPr>
+          <a:xfrm>
+            <a:off x="3595985" y="1361984"/>
+            <a:ext cx="1438274" cy="210094"/>
+          </a:xfrm>
+          <a:prstGeom prst="homePlate">
+            <a:avLst/>
+          </a:prstGeom>
+          <a:solidFill>
+            <a:srgbClr val="00B0F0"/>
+          </a:solidFill>
+          <a:ln>
+            <a:solidFill>
+              <a:srgbClr val="00B0F0"/>
+            </a:solidFill>
+          </a:ln>
+        </p:spPr>
+        <p:style>
+          <a:lnRef idx="2">
+            <a:schemeClr val="accent1">
+              <a:shade val="50000"/>
+            </a:schemeClr>
+          </a:lnRef>
+          <a:fillRef idx="1">
+            <a:schemeClr val="accent1"/>
+          </a:fillRef>
+          <a:effectRef idx="0">
+            <a:schemeClr val="accent1"/>
+          </a:effectRef>
+          <a:fontRef idx="minor">
+            <a:schemeClr val="lt1"/>
+          </a:fontRef>
+        </p:style>
+        <p:txBody>
+          <a:bodyPr wrap="none" rtlCol="0" anchor="ctr"/>
+          <a:lstStyle/>
+          <a:p>
+            <a:pPr algn="ctr"/>
+            <a:r>
+              <a:rPr lang="en-US"/>
+              <a:t>Interrupt T/H</a:t>
+            </a:r>
+          </a:p>
+        </p:txBody>
+      </p:sp>
+    </p:spTree>
+    <p:extLst>
+      <p:ext uri="{BB962C8B-B14F-4D97-AF65-F5344CB8AC3E}">
+        <p14:creationId xmlns:p14="http://schemas.microsoft.com/office/powerpoint/2010/main" val="1059533982"/>
+      </p:ext>
+    </p:extLst>
+  </p:cSld>
+  <p:clrMapOvr>
+    <a:masterClrMapping/>
+  </p:clrMapOvr>
+</p:sld>
+</file>
+
 <file path=ppt/theme/theme1.xml><?xml version="1.0" encoding="utf-8"?>
 <a:theme xmlns:a="http://schemas.openxmlformats.org/drawingml/2006/main" name="Thème Office">
   <a:themeElements>

</xml_diff>